<commit_message>
Added sigma_dependency demo. Updated Power point.
</commit_message>
<xml_diff>
--- a/Agent-Based Gathering Simulations.pptx
+++ b/Agent-Based Gathering Simulations.pptx
@@ -5,10 +5,10 @@
     <p:sldMasterId id="2147483648" r:id="rId4"/>
   </p:sldMasterIdLst>
   <p:notesMasterIdLst>
-    <p:notesMasterId r:id="rId19"/>
+    <p:notesMasterId r:id="rId23"/>
   </p:notesMasterIdLst>
   <p:handoutMasterIdLst>
-    <p:handoutMasterId r:id="rId20"/>
+    <p:handoutMasterId r:id="rId24"/>
   </p:handoutMasterIdLst>
   <p:sldIdLst>
     <p:sldId id="256" r:id="rId5"/>
@@ -18,13 +18,17 @@
     <p:sldId id="3863" r:id="rId9"/>
     <p:sldId id="3856" r:id="rId10"/>
     <p:sldId id="3866" r:id="rId11"/>
-    <p:sldId id="3857" r:id="rId12"/>
-    <p:sldId id="3858" r:id="rId13"/>
-    <p:sldId id="3859" r:id="rId14"/>
-    <p:sldId id="3862" r:id="rId15"/>
-    <p:sldId id="3860" r:id="rId16"/>
-    <p:sldId id="3861" r:id="rId17"/>
-    <p:sldId id="3850" r:id="rId18"/>
+    <p:sldId id="3867" r:id="rId12"/>
+    <p:sldId id="3857" r:id="rId13"/>
+    <p:sldId id="3858" r:id="rId14"/>
+    <p:sldId id="3859" r:id="rId15"/>
+    <p:sldId id="3862" r:id="rId16"/>
+    <p:sldId id="3868" r:id="rId17"/>
+    <p:sldId id="3869" r:id="rId18"/>
+    <p:sldId id="3870" r:id="rId19"/>
+    <p:sldId id="3860" r:id="rId20"/>
+    <p:sldId id="3861" r:id="rId21"/>
+    <p:sldId id="3850" r:id="rId22"/>
   </p:sldIdLst>
   <p:sldSz cx="12192000" cy="6858000"/>
   <p:notesSz cx="6858000" cy="9144000"/>
@@ -234,7 +238,7 @@
           <a:p>
             <a:fld id="{0DC994AA-C437-4EF4-8BEF-0B832D7FA420}" type="datetimeFigureOut">
               <a:rPr lang="en-US" smtClean="0"/>
-              <a:t>3/17/2024</a:t>
+              <a:t>3/24/2024</a:t>
             </a:fld>
             <a:endParaRPr lang="en-US" dirty="0"/>
           </a:p>
@@ -411,7 +415,7 @@
           <a:p>
             <a:fld id="{FB20CE03-6C3A-EB4D-A9B1-7EFD38B58412}" type="datetimeFigureOut">
               <a:rPr lang="en-US" smtClean="0"/>
-              <a:t>3/17/2024</a:t>
+              <a:t>3/24/2024</a:t>
             </a:fld>
             <a:endParaRPr lang="en-US" dirty="0"/>
           </a:p>
@@ -911,7 +915,259 @@
           <a:p>
             <a:fld id="{8B57D50D-BAA9-464B-B391-243138E078D8}" type="slidenum">
               <a:rPr lang="en-US" smtClean="0"/>
-              <a:t>14</a:t>
+              <a:t>8</a:t>
+            </a:fld>
+            <a:endParaRPr lang="en-US" dirty="0"/>
+          </a:p>
+        </p:txBody>
+      </p:sp>
+    </p:spTree>
+    <p:extLst>
+      <p:ext uri="{BB962C8B-B14F-4D97-AF65-F5344CB8AC3E}">
+        <p14:creationId xmlns:p14="http://schemas.microsoft.com/office/powerpoint/2010/main" val="2563526313"/>
+      </p:ext>
+    </p:extLst>
+  </p:cSld>
+  <p:clrMapOvr>
+    <a:masterClrMapping/>
+  </p:clrMapOvr>
+</p:notes>
+</file>
+
+<file path=ppt/notesSlides/notesSlide4.xml><?xml version="1.0" encoding="utf-8"?>
+<p:notes xmlns:a="http://schemas.openxmlformats.org/drawingml/2006/main" xmlns:r="http://schemas.openxmlformats.org/officeDocument/2006/relationships" xmlns:p="http://schemas.openxmlformats.org/presentationml/2006/main">
+  <p:cSld>
+    <p:spTree>
+      <p:nvGrpSpPr>
+        <p:cNvPr id="1" name=""/>
+        <p:cNvGrpSpPr/>
+        <p:nvPr/>
+      </p:nvGrpSpPr>
+      <p:grpSpPr>
+        <a:xfrm>
+          <a:off x="0" y="0"/>
+          <a:ext cx="0" cy="0"/>
+          <a:chOff x="0" y="0"/>
+          <a:chExt cx="0" cy="0"/>
+        </a:xfrm>
+      </p:grpSpPr>
+      <p:sp>
+        <p:nvSpPr>
+          <p:cNvPr id="2" name="Slide Image Placeholder 1"/>
+          <p:cNvSpPr>
+            <a:spLocks noGrp="1" noRot="1" noChangeAspect="1"/>
+          </p:cNvSpPr>
+          <p:nvPr>
+            <p:ph type="sldImg"/>
+          </p:nvPr>
+        </p:nvSpPr>
+        <p:spPr/>
+      </p:sp>
+      <p:sp>
+        <p:nvSpPr>
+          <p:cNvPr id="3" name="Notes Placeholder 2"/>
+          <p:cNvSpPr>
+            <a:spLocks noGrp="1"/>
+          </p:cNvSpPr>
+          <p:nvPr>
+            <p:ph type="body" idx="1"/>
+          </p:nvPr>
+        </p:nvSpPr>
+        <p:spPr/>
+        <p:txBody>
+          <a:bodyPr/>
+          <a:lstStyle/>
+          <a:p>
+            <a:endParaRPr lang="en-US" dirty="0"/>
+          </a:p>
+        </p:txBody>
+      </p:sp>
+      <p:sp>
+        <p:nvSpPr>
+          <p:cNvPr id="4" name="Slide Number Placeholder 3"/>
+          <p:cNvSpPr>
+            <a:spLocks noGrp="1"/>
+          </p:cNvSpPr>
+          <p:nvPr>
+            <p:ph type="sldNum" sz="quarter" idx="5"/>
+          </p:nvPr>
+        </p:nvSpPr>
+        <p:spPr/>
+        <p:txBody>
+          <a:bodyPr/>
+          <a:lstStyle/>
+          <a:p>
+            <a:fld id="{8B57D50D-BAA9-464B-B391-243138E078D8}" type="slidenum">
+              <a:rPr lang="en-US" smtClean="0"/>
+              <a:t>13</a:t>
+            </a:fld>
+            <a:endParaRPr lang="en-US" dirty="0"/>
+          </a:p>
+        </p:txBody>
+      </p:sp>
+    </p:spTree>
+    <p:extLst>
+      <p:ext uri="{BB962C8B-B14F-4D97-AF65-F5344CB8AC3E}">
+        <p14:creationId xmlns:p14="http://schemas.microsoft.com/office/powerpoint/2010/main" val="445932227"/>
+      </p:ext>
+    </p:extLst>
+  </p:cSld>
+  <p:clrMapOvr>
+    <a:masterClrMapping/>
+  </p:clrMapOvr>
+</p:notes>
+</file>
+
+<file path=ppt/notesSlides/notesSlide5.xml><?xml version="1.0" encoding="utf-8"?>
+<p:notes xmlns:a="http://schemas.openxmlformats.org/drawingml/2006/main" xmlns:r="http://schemas.openxmlformats.org/officeDocument/2006/relationships" xmlns:p="http://schemas.openxmlformats.org/presentationml/2006/main">
+  <p:cSld>
+    <p:spTree>
+      <p:nvGrpSpPr>
+        <p:cNvPr id="1" name=""/>
+        <p:cNvGrpSpPr/>
+        <p:nvPr/>
+      </p:nvGrpSpPr>
+      <p:grpSpPr>
+        <a:xfrm>
+          <a:off x="0" y="0"/>
+          <a:ext cx="0" cy="0"/>
+          <a:chOff x="0" y="0"/>
+          <a:chExt cx="0" cy="0"/>
+        </a:xfrm>
+      </p:grpSpPr>
+      <p:sp>
+        <p:nvSpPr>
+          <p:cNvPr id="2" name="Slide Image Placeholder 1"/>
+          <p:cNvSpPr>
+            <a:spLocks noGrp="1" noRot="1" noChangeAspect="1"/>
+          </p:cNvSpPr>
+          <p:nvPr>
+            <p:ph type="sldImg"/>
+          </p:nvPr>
+        </p:nvSpPr>
+        <p:spPr/>
+      </p:sp>
+      <p:sp>
+        <p:nvSpPr>
+          <p:cNvPr id="3" name="Notes Placeholder 2"/>
+          <p:cNvSpPr>
+            <a:spLocks noGrp="1"/>
+          </p:cNvSpPr>
+          <p:nvPr>
+            <p:ph type="body" idx="1"/>
+          </p:nvPr>
+        </p:nvSpPr>
+        <p:spPr/>
+        <p:txBody>
+          <a:bodyPr/>
+          <a:lstStyle/>
+          <a:p>
+            <a:endParaRPr lang="en-US" dirty="0"/>
+          </a:p>
+        </p:txBody>
+      </p:sp>
+      <p:sp>
+        <p:nvSpPr>
+          <p:cNvPr id="4" name="Slide Number Placeholder 3"/>
+          <p:cNvSpPr>
+            <a:spLocks noGrp="1"/>
+          </p:cNvSpPr>
+          <p:nvPr>
+            <p:ph type="sldNum" sz="quarter" idx="5"/>
+          </p:nvPr>
+        </p:nvSpPr>
+        <p:spPr/>
+        <p:txBody>
+          <a:bodyPr/>
+          <a:lstStyle/>
+          <a:p>
+            <a:fld id="{8B57D50D-BAA9-464B-B391-243138E078D8}" type="slidenum">
+              <a:rPr lang="en-US" smtClean="0"/>
+              <a:t>15</a:t>
+            </a:fld>
+            <a:endParaRPr lang="en-US" dirty="0"/>
+          </a:p>
+        </p:txBody>
+      </p:sp>
+    </p:spTree>
+    <p:extLst>
+      <p:ext uri="{BB962C8B-B14F-4D97-AF65-F5344CB8AC3E}">
+        <p14:creationId xmlns:p14="http://schemas.microsoft.com/office/powerpoint/2010/main" val="3711338505"/>
+      </p:ext>
+    </p:extLst>
+  </p:cSld>
+  <p:clrMapOvr>
+    <a:masterClrMapping/>
+  </p:clrMapOvr>
+</p:notes>
+</file>
+
+<file path=ppt/notesSlides/notesSlide6.xml><?xml version="1.0" encoding="utf-8"?>
+<p:notes xmlns:a="http://schemas.openxmlformats.org/drawingml/2006/main" xmlns:r="http://schemas.openxmlformats.org/officeDocument/2006/relationships" xmlns:p="http://schemas.openxmlformats.org/presentationml/2006/main">
+  <p:cSld>
+    <p:spTree>
+      <p:nvGrpSpPr>
+        <p:cNvPr id="1" name=""/>
+        <p:cNvGrpSpPr/>
+        <p:nvPr/>
+      </p:nvGrpSpPr>
+      <p:grpSpPr>
+        <a:xfrm>
+          <a:off x="0" y="0"/>
+          <a:ext cx="0" cy="0"/>
+          <a:chOff x="0" y="0"/>
+          <a:chExt cx="0" cy="0"/>
+        </a:xfrm>
+      </p:grpSpPr>
+      <p:sp>
+        <p:nvSpPr>
+          <p:cNvPr id="2" name="Slide Image Placeholder 1"/>
+          <p:cNvSpPr>
+            <a:spLocks noGrp="1" noRot="1" noChangeAspect="1"/>
+          </p:cNvSpPr>
+          <p:nvPr>
+            <p:ph type="sldImg"/>
+          </p:nvPr>
+        </p:nvSpPr>
+        <p:spPr/>
+      </p:sp>
+      <p:sp>
+        <p:nvSpPr>
+          <p:cNvPr id="3" name="Notes Placeholder 2"/>
+          <p:cNvSpPr>
+            <a:spLocks noGrp="1"/>
+          </p:cNvSpPr>
+          <p:nvPr>
+            <p:ph type="body" idx="1"/>
+          </p:nvPr>
+        </p:nvSpPr>
+        <p:spPr/>
+        <p:txBody>
+          <a:bodyPr/>
+          <a:lstStyle/>
+          <a:p>
+            <a:endParaRPr lang="en-US" dirty="0"/>
+          </a:p>
+        </p:txBody>
+      </p:sp>
+      <p:sp>
+        <p:nvSpPr>
+          <p:cNvPr id="4" name="Slide Number Placeholder 3"/>
+          <p:cNvSpPr>
+            <a:spLocks noGrp="1"/>
+          </p:cNvSpPr>
+          <p:nvPr>
+            <p:ph type="sldNum" sz="quarter" idx="5"/>
+          </p:nvPr>
+        </p:nvSpPr>
+        <p:spPr/>
+        <p:txBody>
+          <a:bodyPr/>
+          <a:lstStyle/>
+          <a:p>
+            <a:fld id="{8B57D50D-BAA9-464B-B391-243138E078D8}" type="slidenum">
+              <a:rPr lang="en-US" smtClean="0"/>
+              <a:t>18</a:t>
             </a:fld>
             <a:endParaRPr lang="en-US" dirty="0"/>
           </a:p>
@@ -2613,7 +2869,7 @@
           <a:p>
             <a:fld id="{D6D8061D-18C3-4F4F-85EF-561633F58754}" type="datetimeFigureOut">
               <a:rPr lang="en-US" smtClean="0"/>
-              <a:t>3/17/2024</a:t>
+              <a:t>3/24/2024</a:t>
             </a:fld>
             <a:endParaRPr lang="en-US" dirty="0"/>
           </a:p>
@@ -3299,7 +3555,7 @@
           <a:p>
             <a:fld id="{D6D8061D-18C3-4F4F-85EF-561633F58754}" type="datetimeFigureOut">
               <a:rPr lang="en-US" smtClean="0"/>
-              <a:t>3/17/2024</a:t>
+              <a:t>3/24/2024</a:t>
             </a:fld>
             <a:endParaRPr lang="en-US" dirty="0"/>
           </a:p>
@@ -3442,7 +3698,7 @@
           <a:p>
             <a:fld id="{D6D8061D-18C3-4F4F-85EF-561633F58754}" type="datetimeFigureOut">
               <a:rPr lang="en-US" smtClean="0"/>
-              <a:t>3/17/2024</a:t>
+              <a:t>3/24/2024</a:t>
             </a:fld>
             <a:endParaRPr lang="en-US" dirty="0"/>
           </a:p>
@@ -4587,7 +4843,7 @@
           <a:p>
             <a:fld id="{D6D8061D-18C3-4F4F-85EF-561633F58754}" type="datetimeFigureOut">
               <a:rPr lang="en-US" smtClean="0"/>
-              <a:t>3/17/2024</a:t>
+              <a:t>3/24/2024</a:t>
             </a:fld>
             <a:endParaRPr lang="en-US" dirty="0"/>
           </a:p>
@@ -6875,7 +7131,7 @@
           <a:p>
             <a:fld id="{D6D8061D-18C3-4F4F-85EF-561633F58754}" type="datetimeFigureOut">
               <a:rPr lang="en-US" smtClean="0"/>
-              <a:t>3/17/2024</a:t>
+              <a:t>3/24/2024</a:t>
             </a:fld>
             <a:endParaRPr lang="en-US" dirty="0"/>
           </a:p>
@@ -8145,7 +8401,7 @@
           <a:p>
             <a:fld id="{D6D8061D-18C3-4F4F-85EF-561633F58754}" type="datetimeFigureOut">
               <a:rPr lang="en-US" smtClean="0"/>
-              <a:t>3/17/2024</a:t>
+              <a:t>3/24/2024</a:t>
             </a:fld>
             <a:endParaRPr lang="en-US" dirty="0"/>
           </a:p>
@@ -9210,7 +9466,7 @@
           <a:p>
             <a:fld id="{D6D8061D-18C3-4F4F-85EF-561633F58754}" type="datetimeFigureOut">
               <a:rPr lang="en-US" smtClean="0"/>
-              <a:t>3/17/2024</a:t>
+              <a:t>3/24/2024</a:t>
             </a:fld>
             <a:endParaRPr lang="en-US" dirty="0"/>
           </a:p>
@@ -9619,7 +9875,7 @@
           <a:p>
             <a:fld id="{D6D8061D-18C3-4F4F-85EF-561633F58754}" type="datetimeFigureOut">
               <a:rPr lang="en-US" smtClean="0"/>
-              <a:t>3/17/2024</a:t>
+              <a:t>3/24/2024</a:t>
             </a:fld>
             <a:endParaRPr lang="en-US" dirty="0"/>
           </a:p>
@@ -10590,7 +10846,7 @@
           <a:p>
             <a:fld id="{D6D8061D-18C3-4F4F-85EF-561633F58754}" type="datetimeFigureOut">
               <a:rPr lang="en-US" smtClean="0"/>
-              <a:t>3/17/2024</a:t>
+              <a:t>3/24/2024</a:t>
             </a:fld>
             <a:endParaRPr lang="en-US" dirty="0"/>
           </a:p>
@@ -10831,7 +11087,7 @@
           <a:p>
             <a:fld id="{D6D8061D-18C3-4F4F-85EF-561633F58754}" type="datetimeFigureOut">
               <a:rPr lang="en-US" smtClean="0"/>
-              <a:t>3/17/2024</a:t>
+              <a:t>3/24/2024</a:t>
             </a:fld>
             <a:endParaRPr lang="en-US" dirty="0"/>
           </a:p>
@@ -11406,6 +11662,225 @@
           <a:p>
             <a:r>
               <a:rPr lang="en-US" dirty="0"/>
+              <a:t>Naive Collision Adjustment</a:t>
+            </a:r>
+            <a:endParaRPr lang="LID4096" dirty="0"/>
+          </a:p>
+        </p:txBody>
+      </p:sp>
+      <mc:AlternateContent xmlns:mc="http://schemas.openxmlformats.org/markup-compatibility/2006" xmlns:a14="http://schemas.microsoft.com/office/drawing/2010/main">
+        <mc:Choice Requires="a14">
+          <p:sp>
+            <p:nvSpPr>
+              <p:cNvPr id="3" name="Content Placeholder 2">
+                <a:extLst>
+                  <a:ext uri="{FF2B5EF4-FFF2-40B4-BE49-F238E27FC236}">
+                    <a16:creationId xmlns:a16="http://schemas.microsoft.com/office/drawing/2014/main" id="{73003A05-105E-BDAB-4561-E6685DEB698F}"/>
+                  </a:ext>
+                </a:extLst>
+              </p:cNvPr>
+              <p:cNvSpPr>
+                <a:spLocks noGrp="1"/>
+              </p:cNvSpPr>
+              <p:nvPr>
+                <p:ph idx="1"/>
+              </p:nvPr>
+            </p:nvSpPr>
+            <p:spPr/>
+            <p:txBody>
+              <a:bodyPr>
+                <a:normAutofit/>
+              </a:bodyPr>
+              <a:lstStyle/>
+              <a:p>
+                <a:pPr marL="342900" indent="-342900">
+                  <a:buFont typeface="Arial" panose="020B0604020202020204" pitchFamily="34" charset="0"/>
+                  <a:buChar char="•"/>
+                </a:pPr>
+                <a:r>
+                  <a:rPr lang="en-US" b="1" dirty="0"/>
+                  <a:t>Idea: </a:t>
+                </a:r>
+                <a:r>
+                  <a:rPr lang="en-US" dirty="0"/>
+                  <a:t>Direct comparison of every agent's position to detect and resolve collisions.</a:t>
+                </a:r>
+              </a:p>
+              <a:p>
+                <a:pPr marL="342900" indent="-342900">
+                  <a:buFont typeface="Arial" panose="020B0604020202020204" pitchFamily="34" charset="0"/>
+                  <a:buChar char="•"/>
+                </a:pPr>
+                <a:r>
+                  <a:rPr lang="en-US" b="1" dirty="0"/>
+                  <a:t>Process: </a:t>
+                </a:r>
+                <a:r>
+                  <a:rPr lang="en-US" dirty="0"/>
+                  <a:t>Compute differences and distances between all agent pairs. Adjust velocities for agents moving towards each other.</a:t>
+                </a:r>
+              </a:p>
+              <a:p>
+                <a:pPr marL="342900" indent="-342900">
+                  <a:buFont typeface="Arial" panose="020B0604020202020204" pitchFamily="34" charset="0"/>
+                  <a:buChar char="•"/>
+                </a:pPr>
+                <a:r>
+                  <a:rPr lang="en-US" dirty="0"/>
+                  <a:t>Time Complexity: </a:t>
+                </a:r>
+                <a14:m>
+                  <m:oMath xmlns:m="http://schemas.openxmlformats.org/officeDocument/2006/math">
+                    <m:r>
+                      <a:rPr lang="en-US" b="0" i="1" smtClean="0">
+                        <a:latin typeface="Cambria Math" panose="02040503050406030204" pitchFamily="18" charset="0"/>
+                      </a:rPr>
+                      <m:t>𝑂</m:t>
+                    </m:r>
+                    <m:d>
+                      <m:dPr>
+                        <m:ctrlPr>
+                          <a:rPr lang="en-US" b="0" i="1" smtClean="0">
+                            <a:latin typeface="Cambria Math" panose="02040503050406030204" pitchFamily="18" charset="0"/>
+                          </a:rPr>
+                        </m:ctrlPr>
+                      </m:dPr>
+                      <m:e>
+                        <m:sSup>
+                          <m:sSupPr>
+                            <m:ctrlPr>
+                              <a:rPr lang="en-US" b="0" i="1" smtClean="0">
+                                <a:latin typeface="Cambria Math" panose="02040503050406030204" pitchFamily="18" charset="0"/>
+                              </a:rPr>
+                            </m:ctrlPr>
+                          </m:sSupPr>
+                          <m:e>
+                            <m:r>
+                              <a:rPr lang="en-US" b="0" i="1" smtClean="0">
+                                <a:latin typeface="Cambria Math" panose="02040503050406030204" pitchFamily="18" charset="0"/>
+                              </a:rPr>
+                              <m:t>𝑛</m:t>
+                            </m:r>
+                          </m:e>
+                          <m:sup>
+                            <m:r>
+                              <a:rPr lang="en-US" b="0" i="1" smtClean="0">
+                                <a:latin typeface="Cambria Math" panose="02040503050406030204" pitchFamily="18" charset="0"/>
+                              </a:rPr>
+                              <m:t>2</m:t>
+                            </m:r>
+                          </m:sup>
+                        </m:sSup>
+                      </m:e>
+                    </m:d>
+                  </m:oMath>
+                </a14:m>
+                <a:endParaRPr lang="en-US" dirty="0"/>
+              </a:p>
+              <a:p>
+                <a:pPr marL="1143000" lvl="1"/>
+                <a:r>
+                  <a:rPr lang="en-US" dirty="0"/>
+                  <a:t>Each agent is compared with every other agent to detect collisions</a:t>
+                </a:r>
+                <a:endParaRPr lang="LID4096" dirty="0"/>
+              </a:p>
+            </p:txBody>
+          </p:sp>
+        </mc:Choice>
+        <mc:Fallback xmlns="">
+          <p:sp>
+            <p:nvSpPr>
+              <p:cNvPr id="3" name="Content Placeholder 2">
+                <a:extLst>
+                  <a:ext uri="{FF2B5EF4-FFF2-40B4-BE49-F238E27FC236}">
+                    <a16:creationId xmlns:a16="http://schemas.microsoft.com/office/drawing/2014/main" id="{73003A05-105E-BDAB-4561-E6685DEB698F}"/>
+                  </a:ext>
+                </a:extLst>
+              </p:cNvPr>
+              <p:cNvSpPr>
+                <a:spLocks noGrp="1" noRot="1" noChangeAspect="1" noMove="1" noResize="1" noEditPoints="1" noAdjustHandles="1" noChangeArrowheads="1" noChangeShapeType="1" noTextEdit="1"/>
+              </p:cNvSpPr>
+              <p:nvPr>
+                <p:ph idx="1"/>
+              </p:nvPr>
+            </p:nvSpPr>
+            <p:spPr>
+              <a:blipFill>
+                <a:blip r:embed="rId2"/>
+                <a:stretch>
+                  <a:fillRect l="-1538"/>
+                </a:stretch>
+              </a:blipFill>
+            </p:spPr>
+            <p:txBody>
+              <a:bodyPr/>
+              <a:lstStyle/>
+              <a:p>
+                <a:r>
+                  <a:rPr lang="LID4096">
+                    <a:noFill/>
+                  </a:rPr>
+                  <a:t> </a:t>
+                </a:r>
+              </a:p>
+            </p:txBody>
+          </p:sp>
+        </mc:Fallback>
+      </mc:AlternateContent>
+    </p:spTree>
+    <p:extLst>
+      <p:ext uri="{BB962C8B-B14F-4D97-AF65-F5344CB8AC3E}">
+        <p14:creationId xmlns:p14="http://schemas.microsoft.com/office/powerpoint/2010/main" val="3032113058"/>
+      </p:ext>
+    </p:extLst>
+  </p:cSld>
+  <p:clrMapOvr>
+    <a:masterClrMapping/>
+  </p:clrMapOvr>
+</p:sld>
+</file>
+
+<file path=ppt/slides/slide11.xml><?xml version="1.0" encoding="utf-8"?>
+<p:sld xmlns:a="http://schemas.openxmlformats.org/drawingml/2006/main" xmlns:r="http://schemas.openxmlformats.org/officeDocument/2006/relationships" xmlns:p="http://schemas.openxmlformats.org/presentationml/2006/main">
+  <p:cSld>
+    <p:spTree>
+      <p:nvGrpSpPr>
+        <p:cNvPr id="1" name=""/>
+        <p:cNvGrpSpPr/>
+        <p:nvPr/>
+      </p:nvGrpSpPr>
+      <p:grpSpPr>
+        <a:xfrm>
+          <a:off x="0" y="0"/>
+          <a:ext cx="0" cy="0"/>
+          <a:chOff x="0" y="0"/>
+          <a:chExt cx="0" cy="0"/>
+        </a:xfrm>
+      </p:grpSpPr>
+      <p:sp>
+        <p:nvSpPr>
+          <p:cNvPr id="2" name="Title 1">
+            <a:extLst>
+              <a:ext uri="{FF2B5EF4-FFF2-40B4-BE49-F238E27FC236}">
+                <a16:creationId xmlns:a16="http://schemas.microsoft.com/office/drawing/2014/main" id="{EA8C3738-60A7-4FA6-71C4-E51A890C4F3B}"/>
+              </a:ext>
+            </a:extLst>
+          </p:cNvPr>
+          <p:cNvSpPr>
+            <a:spLocks noGrp="1"/>
+          </p:cNvSpPr>
+          <p:nvPr>
+            <p:ph type="title"/>
+          </p:nvPr>
+        </p:nvSpPr>
+        <p:spPr/>
+        <p:txBody>
+          <a:bodyPr/>
+          <a:lstStyle/>
+          <a:p>
+            <a:r>
+              <a:rPr lang="en-US" dirty="0"/>
               <a:t>Sweep and Prune Method</a:t>
             </a:r>
             <a:endParaRPr lang="LID4096" dirty="0"/>
@@ -11762,7 +12237,7 @@
 </p:sld>
 </file>
 
-<file path=ppt/slides/slide11.xml><?xml version="1.0" encoding="utf-8"?>
+<file path=ppt/slides/slide12.xml><?xml version="1.0" encoding="utf-8"?>
 <p:sld xmlns:a="http://schemas.openxmlformats.org/drawingml/2006/main" xmlns:r="http://schemas.openxmlformats.org/officeDocument/2006/relationships" xmlns:p="http://schemas.openxmlformats.org/presentationml/2006/main">
   <p:cSld>
     <p:spTree>
@@ -11826,7 +12301,741 @@
 </p:sld>
 </file>
 
-<file path=ppt/slides/slide12.xml><?xml version="1.0" encoding="utf-8"?>
+<file path=ppt/slides/slide13.xml><?xml version="1.0" encoding="utf-8"?>
+<p:sld xmlns:a="http://schemas.openxmlformats.org/drawingml/2006/main" xmlns:r="http://schemas.openxmlformats.org/officeDocument/2006/relationships" xmlns:p="http://schemas.openxmlformats.org/presentationml/2006/main">
+  <p:cSld>
+    <p:spTree>
+      <p:nvGrpSpPr>
+        <p:cNvPr id="1" name=""/>
+        <p:cNvGrpSpPr/>
+        <p:nvPr/>
+      </p:nvGrpSpPr>
+      <p:grpSpPr>
+        <a:xfrm>
+          <a:off x="0" y="0"/>
+          <a:ext cx="0" cy="0"/>
+          <a:chOff x="0" y="0"/>
+          <a:chExt cx="0" cy="0"/>
+        </a:xfrm>
+      </p:grpSpPr>
+      <p:sp>
+        <p:nvSpPr>
+          <p:cNvPr id="2" name="Title 1">
+            <a:extLst>
+              <a:ext uri="{FF2B5EF4-FFF2-40B4-BE49-F238E27FC236}">
+                <a16:creationId xmlns:a16="http://schemas.microsoft.com/office/drawing/2014/main" id="{BF463CB3-2956-E8D2-C23D-A3BAA7295DEC}"/>
+              </a:ext>
+            </a:extLst>
+          </p:cNvPr>
+          <p:cNvSpPr>
+            <a:spLocks noGrp="1"/>
+          </p:cNvSpPr>
+          <p:nvPr>
+            <p:ph type="ctrTitle"/>
+          </p:nvPr>
+        </p:nvSpPr>
+        <p:spPr>
+          <a:xfrm>
+            <a:off x="2815929" y="1349825"/>
+            <a:ext cx="6560142" cy="3063149"/>
+          </a:xfrm>
+          <a:noFill/>
+        </p:spPr>
+        <p:txBody>
+          <a:bodyPr/>
+          <a:lstStyle/>
+          <a:p>
+            <a:r>
+              <a:rPr lang="en-US" dirty="0"/>
+              <a:t>DEMO</a:t>
+            </a:r>
+          </a:p>
+        </p:txBody>
+      </p:sp>
+      <p:sp>
+        <p:nvSpPr>
+          <p:cNvPr id="3" name="Subtitle 2">
+            <a:extLst>
+              <a:ext uri="{FF2B5EF4-FFF2-40B4-BE49-F238E27FC236}">
+                <a16:creationId xmlns:a16="http://schemas.microsoft.com/office/drawing/2014/main" id="{FEECEBD4-35BF-26BB-D438-DA43EBD5EE89}"/>
+              </a:ext>
+            </a:extLst>
+          </p:cNvPr>
+          <p:cNvSpPr>
+            <a:spLocks noGrp="1"/>
+          </p:cNvSpPr>
+          <p:nvPr>
+            <p:ph type="subTitle" idx="1"/>
+          </p:nvPr>
+        </p:nvSpPr>
+        <p:spPr>
+          <a:xfrm>
+            <a:off x="2815929" y="4412973"/>
+            <a:ext cx="6560142" cy="1935571"/>
+          </a:xfrm>
+          <a:noFill/>
+        </p:spPr>
+        <p:txBody>
+          <a:bodyPr/>
+          <a:lstStyle/>
+          <a:p>
+            <a:r>
+              <a:rPr lang="en-US" dirty="0"/>
+              <a:t>YAY!</a:t>
+            </a:r>
+          </a:p>
+        </p:txBody>
+      </p:sp>
+    </p:spTree>
+    <p:extLst>
+      <p:ext uri="{BB962C8B-B14F-4D97-AF65-F5344CB8AC3E}">
+        <p14:creationId xmlns:p14="http://schemas.microsoft.com/office/powerpoint/2010/main" val="1532967226"/>
+      </p:ext>
+    </p:extLst>
+  </p:cSld>
+  <p:clrMapOvr>
+    <a:masterClrMapping/>
+  </p:clrMapOvr>
+</p:sld>
+</file>
+
+<file path=ppt/slides/slide14.xml><?xml version="1.0" encoding="utf-8"?>
+<p:sld xmlns:a="http://schemas.openxmlformats.org/drawingml/2006/main" xmlns:r="http://schemas.openxmlformats.org/officeDocument/2006/relationships" xmlns:p="http://schemas.openxmlformats.org/presentationml/2006/main">
+  <p:cSld>
+    <p:spTree>
+      <p:nvGrpSpPr>
+        <p:cNvPr id="1" name=""/>
+        <p:cNvGrpSpPr/>
+        <p:nvPr/>
+      </p:nvGrpSpPr>
+      <p:grpSpPr>
+        <a:xfrm>
+          <a:off x="0" y="0"/>
+          <a:ext cx="0" cy="0"/>
+          <a:chOff x="0" y="0"/>
+          <a:chExt cx="0" cy="0"/>
+        </a:xfrm>
+      </p:grpSpPr>
+      <p:sp>
+        <p:nvSpPr>
+          <p:cNvPr id="2" name="Title 1">
+            <a:extLst>
+              <a:ext uri="{FF2B5EF4-FFF2-40B4-BE49-F238E27FC236}">
+                <a16:creationId xmlns:a16="http://schemas.microsoft.com/office/drawing/2014/main" id="{EA8C3738-60A7-4FA6-71C4-E51A890C4F3B}"/>
+              </a:ext>
+            </a:extLst>
+          </p:cNvPr>
+          <p:cNvSpPr>
+            <a:spLocks noGrp="1"/>
+          </p:cNvSpPr>
+          <p:nvPr>
+            <p:ph type="title"/>
+          </p:nvPr>
+        </p:nvSpPr>
+        <p:spPr/>
+        <p:txBody>
+          <a:bodyPr/>
+          <a:lstStyle/>
+          <a:p>
+            <a:r>
+              <a:rPr lang="en-US" dirty="0"/>
+              <a:t>Scalability of time-discrete system</a:t>
+            </a:r>
+            <a:br>
+              <a:rPr lang="en-US" dirty="0"/>
+            </a:br>
+            <a:r>
+              <a:rPr lang="en-US" dirty="0"/>
+              <a:t>Position sensing</a:t>
+            </a:r>
+            <a:endParaRPr lang="LID4096" dirty="0"/>
+          </a:p>
+        </p:txBody>
+      </p:sp>
+      <p:pic>
+        <p:nvPicPr>
+          <p:cNvPr id="5" name="מציין מיקום תוכן 4">
+            <a:extLst>
+              <a:ext uri="{FF2B5EF4-FFF2-40B4-BE49-F238E27FC236}">
+                <a16:creationId xmlns:a16="http://schemas.microsoft.com/office/drawing/2014/main" id="{E0EC84F2-1569-51A3-78F8-D5736EDD905C}"/>
+              </a:ext>
+            </a:extLst>
+          </p:cNvPr>
+          <p:cNvPicPr>
+            <a:picLocks noGrp="1" noChangeAspect="1"/>
+          </p:cNvPicPr>
+          <p:nvPr>
+            <p:ph idx="1"/>
+          </p:nvPr>
+        </p:nvPicPr>
+        <p:blipFill>
+          <a:blip r:embed="rId2"/>
+          <a:stretch>
+            <a:fillRect/>
+          </a:stretch>
+        </p:blipFill>
+        <p:spPr>
+          <a:xfrm>
+            <a:off x="5103161" y="1798862"/>
+            <a:ext cx="7126161" cy="4288759"/>
+          </a:xfrm>
+        </p:spPr>
+      </p:pic>
+      <p:pic>
+        <p:nvPicPr>
+          <p:cNvPr id="7" name="תמונה 6">
+            <a:extLst>
+              <a:ext uri="{FF2B5EF4-FFF2-40B4-BE49-F238E27FC236}">
+                <a16:creationId xmlns:a16="http://schemas.microsoft.com/office/drawing/2014/main" id="{5724CADF-7D60-600E-4AF0-54F7EE03BA0B}"/>
+              </a:ext>
+            </a:extLst>
+          </p:cNvPr>
+          <p:cNvPicPr>
+            <a:picLocks noChangeAspect="1"/>
+          </p:cNvPicPr>
+          <p:nvPr/>
+        </p:nvPicPr>
+        <p:blipFill>
+          <a:blip r:embed="rId3"/>
+          <a:stretch>
+            <a:fillRect/>
+          </a:stretch>
+        </p:blipFill>
+        <p:spPr>
+          <a:xfrm>
+            <a:off x="5132708" y="699894"/>
+            <a:ext cx="4343776" cy="838273"/>
+          </a:xfrm>
+          <a:prstGeom prst="rect">
+            <a:avLst/>
+          </a:prstGeom>
+        </p:spPr>
+      </p:pic>
+      <p:sp>
+        <p:nvSpPr>
+          <p:cNvPr id="8" name="תיבת טקסט 7">
+            <a:extLst>
+              <a:ext uri="{FF2B5EF4-FFF2-40B4-BE49-F238E27FC236}">
+                <a16:creationId xmlns:a16="http://schemas.microsoft.com/office/drawing/2014/main" id="{9504493C-D5E3-0CD7-3CED-7BA22A0898E0}"/>
+              </a:ext>
+            </a:extLst>
+          </p:cNvPr>
+          <p:cNvSpPr txBox="1"/>
+          <p:nvPr/>
+        </p:nvSpPr>
+        <p:spPr>
+          <a:xfrm>
+            <a:off x="5225142" y="439199"/>
+            <a:ext cx="1903445" cy="369332"/>
+          </a:xfrm>
+          <a:prstGeom prst="rect">
+            <a:avLst/>
+          </a:prstGeom>
+          <a:noFill/>
+        </p:spPr>
+        <p:txBody>
+          <a:bodyPr wrap="square" rtlCol="1">
+            <a:spAutoFit/>
+          </a:bodyPr>
+          <a:lstStyle/>
+          <a:p>
+            <a:r>
+              <a:rPr lang="en-US" dirty="0"/>
+              <a:t>Dynamics law:</a:t>
+            </a:r>
+            <a:endParaRPr lang="he-IL" dirty="0"/>
+          </a:p>
+        </p:txBody>
+      </p:sp>
+      <p:grpSp>
+        <p:nvGrpSpPr>
+          <p:cNvPr id="13" name="קבוצה 12">
+            <a:extLst>
+              <a:ext uri="{FF2B5EF4-FFF2-40B4-BE49-F238E27FC236}">
+                <a16:creationId xmlns:a16="http://schemas.microsoft.com/office/drawing/2014/main" id="{B1924D2F-4E70-E858-0EB4-19473D6748FC}"/>
+              </a:ext>
+            </a:extLst>
+          </p:cNvPr>
+          <p:cNvGrpSpPr/>
+          <p:nvPr/>
+        </p:nvGrpSpPr>
+        <p:grpSpPr>
+          <a:xfrm>
+            <a:off x="3379408" y="5414456"/>
+            <a:ext cx="3817901" cy="845778"/>
+            <a:chOff x="3382346" y="5367803"/>
+            <a:chExt cx="3817901" cy="845778"/>
+          </a:xfrm>
+        </p:grpSpPr>
+        <p:sp>
+          <p:nvSpPr>
+            <p:cNvPr id="10" name="חץ: ימינה 9">
+              <a:extLst>
+                <a:ext uri="{FF2B5EF4-FFF2-40B4-BE49-F238E27FC236}">
+                  <a16:creationId xmlns:a16="http://schemas.microsoft.com/office/drawing/2014/main" id="{4AA0A2DF-F87F-F102-4420-9C15CA35131B}"/>
+                </a:ext>
+              </a:extLst>
+            </p:cNvPr>
+            <p:cNvSpPr/>
+            <p:nvPr/>
+          </p:nvSpPr>
+          <p:spPr>
+            <a:xfrm rot="9365277">
+              <a:off x="6127226" y="5367803"/>
+              <a:ext cx="1073021" cy="829782"/>
+            </a:xfrm>
+            <a:prstGeom prst="rightArrow">
+              <a:avLst/>
+            </a:prstGeom>
+          </p:spPr>
+          <p:style>
+            <a:lnRef idx="2">
+              <a:schemeClr val="accent1">
+                <a:shade val="15000"/>
+              </a:schemeClr>
+            </a:lnRef>
+            <a:fillRef idx="1">
+              <a:schemeClr val="accent1"/>
+            </a:fillRef>
+            <a:effectRef idx="0">
+              <a:schemeClr val="accent1"/>
+            </a:effectRef>
+            <a:fontRef idx="minor">
+              <a:schemeClr val="lt1"/>
+            </a:fontRef>
+          </p:style>
+          <p:txBody>
+            <a:bodyPr rtlCol="1" anchor="ctr"/>
+            <a:lstStyle/>
+            <a:p>
+              <a:pPr algn="ctr"/>
+              <a:endParaRPr lang="he-IL"/>
+            </a:p>
+          </p:txBody>
+        </p:sp>
+        <mc:AlternateContent xmlns:mc="http://schemas.openxmlformats.org/markup-compatibility/2006">
+          <mc:Choice xmlns:a14="http://schemas.microsoft.com/office/drawing/2010/main" Requires="a14">
+            <p:sp>
+              <p:nvSpPr>
+                <p:cNvPr id="12" name="תיבת טקסט 11">
+                  <a:extLst>
+                    <a:ext uri="{FF2B5EF4-FFF2-40B4-BE49-F238E27FC236}">
+                      <a16:creationId xmlns:a16="http://schemas.microsoft.com/office/drawing/2014/main" id="{A5714C43-3F80-BE6C-5316-0BBB86589056}"/>
+                    </a:ext>
+                  </a:extLst>
+                </p:cNvPr>
+                <p:cNvSpPr txBox="1"/>
+                <p:nvPr/>
+              </p:nvSpPr>
+              <p:spPr>
+                <a:xfrm>
+                  <a:off x="3382346" y="5782694"/>
+                  <a:ext cx="914400" cy="430887"/>
+                </a:xfrm>
+                <a:prstGeom prst="rect">
+                  <a:avLst/>
+                </a:prstGeom>
+                <a:noFill/>
+              </p:spPr>
+              <p:txBody>
+                <a:bodyPr wrap="square" rtlCol="1">
+                  <a:spAutoFit/>
+                </a:bodyPr>
+                <a:lstStyle/>
+                <a:p>
+                  <a14:m>
+                    <m:oMathPara xmlns:m="http://schemas.openxmlformats.org/officeDocument/2006/math">
+                      <m:oMathParaPr>
+                        <m:jc m:val="centerGroup"/>
+                      </m:oMathParaPr>
+                      <m:oMath xmlns:m="http://schemas.openxmlformats.org/officeDocument/2006/math">
+                        <m:r>
+                          <a:rPr lang="en-US" sz="2200" b="0" i="1" smtClean="0">
+                            <a:solidFill>
+                              <a:schemeClr val="accent6">
+                                <a:lumMod val="75000"/>
+                              </a:schemeClr>
+                            </a:solidFill>
+                            <a:latin typeface="Cambria Math" panose="02040503050406030204" pitchFamily="18" charset="0"/>
+                          </a:rPr>
+                          <m:t>𝜎</m:t>
+                        </m:r>
+                        <m:r>
+                          <a:rPr lang="en-US" sz="2200" b="0" i="1" smtClean="0">
+                            <a:solidFill>
+                              <a:schemeClr val="accent6">
+                                <a:lumMod val="75000"/>
+                              </a:schemeClr>
+                            </a:solidFill>
+                            <a:latin typeface="Cambria Math" panose="02040503050406030204" pitchFamily="18" charset="0"/>
+                          </a:rPr>
+                          <m:t> </m:t>
+                        </m:r>
+                        <m:r>
+                          <a:rPr lang="en-US" sz="2200" b="0" i="1" smtClean="0">
+                            <a:solidFill>
+                              <a:schemeClr val="accent6">
+                                <a:lumMod val="75000"/>
+                              </a:schemeClr>
+                            </a:solidFill>
+                            <a:latin typeface="Cambria Math" panose="02040503050406030204" pitchFamily="18" charset="0"/>
+                          </a:rPr>
+                          <m:t>𝑖𝑠</m:t>
+                        </m:r>
+                        <m:r>
+                          <a:rPr lang="en-US" sz="2200" b="0" i="1" smtClean="0">
+                            <a:solidFill>
+                              <a:schemeClr val="accent6">
+                                <a:lumMod val="75000"/>
+                              </a:schemeClr>
+                            </a:solidFill>
+                            <a:latin typeface="Cambria Math" panose="02040503050406030204" pitchFamily="18" charset="0"/>
+                          </a:rPr>
+                          <m:t> </m:t>
+                        </m:r>
+                        <m:r>
+                          <a:rPr lang="en-US" sz="2200" b="0" i="1" smtClean="0">
+                            <a:solidFill>
+                              <a:schemeClr val="accent6">
+                                <a:lumMod val="75000"/>
+                              </a:schemeClr>
+                            </a:solidFill>
+                            <a:latin typeface="Cambria Math" panose="02040503050406030204" pitchFamily="18" charset="0"/>
+                          </a:rPr>
+                          <m:t>𝑎</m:t>
+                        </m:r>
+                        <m:r>
+                          <a:rPr lang="en-US" sz="2200" b="0" i="1" smtClean="0">
+                            <a:solidFill>
+                              <a:schemeClr val="accent6">
+                                <a:lumMod val="75000"/>
+                              </a:schemeClr>
+                            </a:solidFill>
+                            <a:latin typeface="Cambria Math" panose="02040503050406030204" pitchFamily="18" charset="0"/>
+                          </a:rPr>
+                          <m:t> </m:t>
+                        </m:r>
+                        <m:r>
+                          <a:rPr lang="en-US" sz="2200" b="0" i="1" smtClean="0">
+                            <a:solidFill>
+                              <a:schemeClr val="accent6">
+                                <a:lumMod val="75000"/>
+                              </a:schemeClr>
+                            </a:solidFill>
+                            <a:latin typeface="Cambria Math" panose="02040503050406030204" pitchFamily="18" charset="0"/>
+                          </a:rPr>
+                          <m:t>𝑓𝑢𝑛𝑐𝑡𝑖𝑜𝑛</m:t>
+                        </m:r>
+                        <m:r>
+                          <a:rPr lang="en-US" sz="2200" b="0" i="1" smtClean="0">
+                            <a:solidFill>
+                              <a:schemeClr val="accent6">
+                                <a:lumMod val="75000"/>
+                              </a:schemeClr>
+                            </a:solidFill>
+                            <a:latin typeface="Cambria Math" panose="02040503050406030204" pitchFamily="18" charset="0"/>
+                          </a:rPr>
+                          <m:t> </m:t>
+                        </m:r>
+                        <m:r>
+                          <a:rPr lang="en-US" sz="2200" b="0" i="1" smtClean="0">
+                            <a:solidFill>
+                              <a:schemeClr val="accent6">
+                                <a:lumMod val="75000"/>
+                              </a:schemeClr>
+                            </a:solidFill>
+                            <a:latin typeface="Cambria Math" panose="02040503050406030204" pitchFamily="18" charset="0"/>
+                          </a:rPr>
+                          <m:t>𝑜𝑓</m:t>
+                        </m:r>
+                        <m:r>
+                          <a:rPr lang="en-US" sz="2200" b="0" i="1" smtClean="0">
+                            <a:solidFill>
+                              <a:schemeClr val="accent6">
+                                <a:lumMod val="75000"/>
+                              </a:schemeClr>
+                            </a:solidFill>
+                            <a:latin typeface="Cambria Math" panose="02040503050406030204" pitchFamily="18" charset="0"/>
+                          </a:rPr>
+                          <m:t> </m:t>
+                        </m:r>
+                        <m:r>
+                          <a:rPr lang="en-US" sz="2200" b="0" i="1" smtClean="0">
+                            <a:solidFill>
+                              <a:schemeClr val="accent6">
+                                <a:lumMod val="75000"/>
+                              </a:schemeClr>
+                            </a:solidFill>
+                            <a:latin typeface="Cambria Math" panose="02040503050406030204" pitchFamily="18" charset="0"/>
+                          </a:rPr>
+                          <m:t>𝑛</m:t>
+                        </m:r>
+                        <m:r>
+                          <a:rPr lang="en-US" sz="2200" b="0" i="1" smtClean="0">
+                            <a:solidFill>
+                              <a:schemeClr val="accent6">
+                                <a:lumMod val="75000"/>
+                              </a:schemeClr>
+                            </a:solidFill>
+                            <a:latin typeface="Cambria Math" panose="02040503050406030204" pitchFamily="18" charset="0"/>
+                          </a:rPr>
+                          <m:t> </m:t>
+                        </m:r>
+                      </m:oMath>
+                    </m:oMathPara>
+                  </a14:m>
+                  <a:endParaRPr lang="he-IL" sz="2200" dirty="0">
+                    <a:solidFill>
+                      <a:schemeClr val="accent6">
+                        <a:lumMod val="75000"/>
+                      </a:schemeClr>
+                    </a:solidFill>
+                  </a:endParaRPr>
+                </a:p>
+              </p:txBody>
+            </p:sp>
+          </mc:Choice>
+          <mc:Fallback>
+            <p:sp>
+              <p:nvSpPr>
+                <p:cNvPr id="12" name="תיבת טקסט 11">
+                  <a:extLst>
+                    <a:ext uri="{FF2B5EF4-FFF2-40B4-BE49-F238E27FC236}">
+                      <a16:creationId xmlns:a16="http://schemas.microsoft.com/office/drawing/2014/main" id="{A5714C43-3F80-BE6C-5316-0BBB86589056}"/>
+                    </a:ext>
+                  </a:extLst>
+                </p:cNvPr>
+                <p:cNvSpPr txBox="1">
+                  <a:spLocks noRot="1" noChangeAspect="1" noMove="1" noResize="1" noEditPoints="1" noAdjustHandles="1" noChangeArrowheads="1" noChangeShapeType="1" noTextEdit="1"/>
+                </p:cNvSpPr>
+                <p:nvPr/>
+              </p:nvSpPr>
+              <p:spPr>
+                <a:xfrm>
+                  <a:off x="3382346" y="5782694"/>
+                  <a:ext cx="914400" cy="430887"/>
+                </a:xfrm>
+                <a:prstGeom prst="rect">
+                  <a:avLst/>
+                </a:prstGeom>
+                <a:blipFill>
+                  <a:blip r:embed="rId4"/>
+                  <a:stretch>
+                    <a:fillRect r="-186000" b="-18310"/>
+                  </a:stretch>
+                </a:blipFill>
+              </p:spPr>
+              <p:txBody>
+                <a:bodyPr/>
+                <a:lstStyle/>
+                <a:p>
+                  <a:r>
+                    <a:rPr lang="he-IL">
+                      <a:noFill/>
+                    </a:rPr>
+                    <a:t> </a:t>
+                  </a:r>
+                </a:p>
+              </p:txBody>
+            </p:sp>
+          </mc:Fallback>
+        </mc:AlternateContent>
+      </p:grpSp>
+    </p:spTree>
+    <p:extLst>
+      <p:ext uri="{BB962C8B-B14F-4D97-AF65-F5344CB8AC3E}">
+        <p14:creationId xmlns:p14="http://schemas.microsoft.com/office/powerpoint/2010/main" val="905722963"/>
+      </p:ext>
+    </p:extLst>
+  </p:cSld>
+  <p:clrMapOvr>
+    <a:masterClrMapping/>
+  </p:clrMapOvr>
+  <p:timing>
+    <p:tnLst>
+      <p:par>
+        <p:cTn id="1" dur="indefinite" restart="never" nodeType="tmRoot">
+          <p:childTnLst>
+            <p:seq concurrent="1" nextAc="seek">
+              <p:cTn id="2" dur="indefinite" nodeType="mainSeq">
+                <p:childTnLst>
+                  <p:par>
+                    <p:cTn id="3" fill="hold">
+                      <p:stCondLst>
+                        <p:cond delay="indefinite"/>
+                      </p:stCondLst>
+                      <p:childTnLst>
+                        <p:par>
+                          <p:cTn id="4" fill="hold">
+                            <p:stCondLst>
+                              <p:cond delay="0"/>
+                            </p:stCondLst>
+                            <p:childTnLst>
+                              <p:par>
+                                <p:cTn id="5" presetID="10" presetClass="entr" presetSubtype="0" fill="hold" nodeType="clickEffect">
+                                  <p:stCondLst>
+                                    <p:cond delay="0"/>
+                                  </p:stCondLst>
+                                  <p:childTnLst>
+                                    <p:set>
+                                      <p:cBhvr>
+                                        <p:cTn id="6" dur="1" fill="hold">
+                                          <p:stCondLst>
+                                            <p:cond delay="0"/>
+                                          </p:stCondLst>
+                                        </p:cTn>
+                                        <p:tgtEl>
+                                          <p:spTgt spid="13"/>
+                                        </p:tgtEl>
+                                        <p:attrNameLst>
+                                          <p:attrName>style.visibility</p:attrName>
+                                        </p:attrNameLst>
+                                      </p:cBhvr>
+                                      <p:to>
+                                        <p:strVal val="visible"/>
+                                      </p:to>
+                                    </p:set>
+                                    <p:animEffect transition="in" filter="fade">
+                                      <p:cBhvr>
+                                        <p:cTn id="7" dur="500"/>
+                                        <p:tgtEl>
+                                          <p:spTgt spid="13"/>
+                                        </p:tgtEl>
+                                      </p:cBhvr>
+                                    </p:animEffect>
+                                  </p:childTnLst>
+                                </p:cTn>
+                              </p:par>
+                            </p:childTnLst>
+                          </p:cTn>
+                        </p:par>
+                      </p:childTnLst>
+                    </p:cTn>
+                  </p:par>
+                </p:childTnLst>
+              </p:cTn>
+              <p:prevCondLst>
+                <p:cond evt="onPrev" delay="0">
+                  <p:tgtEl>
+                    <p:sldTgt/>
+                  </p:tgtEl>
+                </p:cond>
+              </p:prevCondLst>
+              <p:nextCondLst>
+                <p:cond evt="onNext" delay="0">
+                  <p:tgtEl>
+                    <p:sldTgt/>
+                  </p:tgtEl>
+                </p:cond>
+              </p:nextCondLst>
+            </p:seq>
+          </p:childTnLst>
+        </p:cTn>
+      </p:par>
+    </p:tnLst>
+  </p:timing>
+</p:sld>
+</file>
+
+<file path=ppt/slides/slide15.xml><?xml version="1.0" encoding="utf-8"?>
+<p:sld xmlns:a="http://schemas.openxmlformats.org/drawingml/2006/main" xmlns:r="http://schemas.openxmlformats.org/officeDocument/2006/relationships" xmlns:p="http://schemas.openxmlformats.org/presentationml/2006/main">
+  <p:cSld>
+    <p:spTree>
+      <p:nvGrpSpPr>
+        <p:cNvPr id="1" name=""/>
+        <p:cNvGrpSpPr/>
+        <p:nvPr/>
+      </p:nvGrpSpPr>
+      <p:grpSpPr>
+        <a:xfrm>
+          <a:off x="0" y="0"/>
+          <a:ext cx="0" cy="0"/>
+          <a:chOff x="0" y="0"/>
+          <a:chExt cx="0" cy="0"/>
+        </a:xfrm>
+      </p:grpSpPr>
+      <p:sp>
+        <p:nvSpPr>
+          <p:cNvPr id="2" name="Title 1">
+            <a:extLst>
+              <a:ext uri="{FF2B5EF4-FFF2-40B4-BE49-F238E27FC236}">
+                <a16:creationId xmlns:a16="http://schemas.microsoft.com/office/drawing/2014/main" id="{BF463CB3-2956-E8D2-C23D-A3BAA7295DEC}"/>
+              </a:ext>
+            </a:extLst>
+          </p:cNvPr>
+          <p:cNvSpPr>
+            <a:spLocks noGrp="1"/>
+          </p:cNvSpPr>
+          <p:nvPr>
+            <p:ph type="ctrTitle"/>
+          </p:nvPr>
+        </p:nvSpPr>
+        <p:spPr>
+          <a:xfrm>
+            <a:off x="2815929" y="1349825"/>
+            <a:ext cx="6560142" cy="3063149"/>
+          </a:xfrm>
+          <a:noFill/>
+        </p:spPr>
+        <p:txBody>
+          <a:bodyPr/>
+          <a:lstStyle/>
+          <a:p>
+            <a:r>
+              <a:rPr lang="en-US" dirty="0"/>
+              <a:t>DEMO</a:t>
+            </a:r>
+          </a:p>
+        </p:txBody>
+      </p:sp>
+      <p:sp>
+        <p:nvSpPr>
+          <p:cNvPr id="3" name="Subtitle 2">
+            <a:extLst>
+              <a:ext uri="{FF2B5EF4-FFF2-40B4-BE49-F238E27FC236}">
+                <a16:creationId xmlns:a16="http://schemas.microsoft.com/office/drawing/2014/main" id="{FEECEBD4-35BF-26BB-D438-DA43EBD5EE89}"/>
+              </a:ext>
+            </a:extLst>
+          </p:cNvPr>
+          <p:cNvSpPr>
+            <a:spLocks noGrp="1"/>
+          </p:cNvSpPr>
+          <p:nvPr>
+            <p:ph type="subTitle" idx="1"/>
+          </p:nvPr>
+        </p:nvSpPr>
+        <p:spPr>
+          <a:xfrm>
+            <a:off x="2815929" y="4412973"/>
+            <a:ext cx="6560142" cy="1935571"/>
+          </a:xfrm>
+          <a:noFill/>
+        </p:spPr>
+        <p:txBody>
+          <a:bodyPr/>
+          <a:lstStyle/>
+          <a:p>
+            <a:r>
+              <a:rPr lang="en-US" dirty="0"/>
+              <a:t>YAY!</a:t>
+            </a:r>
+          </a:p>
+        </p:txBody>
+      </p:sp>
+    </p:spTree>
+    <p:extLst>
+      <p:ext uri="{BB962C8B-B14F-4D97-AF65-F5344CB8AC3E}">
+        <p14:creationId xmlns:p14="http://schemas.microsoft.com/office/powerpoint/2010/main" val="635612086"/>
+      </p:ext>
+    </p:extLst>
+  </p:cSld>
+  <p:clrMapOvr>
+    <a:masterClrMapping/>
+  </p:clrMapOvr>
+</p:sld>
+</file>
+
+<file path=ppt/slides/slide16.xml><?xml version="1.0" encoding="utf-8"?>
 <p:sld xmlns:a="http://schemas.openxmlformats.org/drawingml/2006/main" xmlns:r="http://schemas.openxmlformats.org/officeDocument/2006/relationships" xmlns:p="http://schemas.openxmlformats.org/presentationml/2006/main">
   <p:cSld>
     <p:spTree>
@@ -12208,7 +13417,7 @@
 </p:sld>
 </file>
 
-<file path=ppt/slides/slide13.xml><?xml version="1.0" encoding="utf-8"?>
+<file path=ppt/slides/slide17.xml><?xml version="1.0" encoding="utf-8"?>
 <p:sld xmlns:a="http://schemas.openxmlformats.org/drawingml/2006/main" xmlns:r="http://schemas.openxmlformats.org/officeDocument/2006/relationships" xmlns:p="http://schemas.openxmlformats.org/presentationml/2006/main">
   <p:cSld>
     <p:spTree>
@@ -12273,7 +13482,7 @@
 </p:sld>
 </file>
 
-<file path=ppt/slides/slide14.xml><?xml version="1.0" encoding="utf-8"?>
+<file path=ppt/slides/slide18.xml><?xml version="1.0" encoding="utf-8"?>
 <p:sld xmlns:a="http://schemas.openxmlformats.org/drawingml/2006/main" xmlns:r="http://schemas.openxmlformats.org/officeDocument/2006/relationships" xmlns:p="http://schemas.openxmlformats.org/presentationml/2006/main">
   <p:cSld>
     <p:spTree>
@@ -12534,8 +13743,8 @@
           </a:p>
         </p:txBody>
       </p:sp>
-      <mc:AlternateContent xmlns:mc="http://schemas.openxmlformats.org/markup-compatibility/2006">
-        <mc:Choice xmlns:a14="http://schemas.microsoft.com/office/drawing/2010/main" Requires="a14">
+      <mc:AlternateContent xmlns:mc="http://schemas.openxmlformats.org/markup-compatibility/2006" xmlns:a14="http://schemas.microsoft.com/office/drawing/2010/main">
+        <mc:Choice Requires="a14">
           <p:sp>
             <p:nvSpPr>
               <p:cNvPr id="3" name="Content Placeholder 2">
@@ -13631,7 +14840,7 @@
             </p:txBody>
           </p:sp>
         </mc:Choice>
-        <mc:Fallback>
+        <mc:Fallback xmlns="">
           <p:sp>
             <p:nvSpPr>
               <p:cNvPr id="3" name="Content Placeholder 2">
@@ -13955,7 +15164,7 @@
             </p:spPr>
             <p:txBody>
               <a:bodyPr>
-                <a:normAutofit fontScale="85000" lnSpcReduction="20000"/>
+                <a:normAutofit fontScale="85000" lnSpcReduction="10000"/>
               </a:bodyPr>
               <a:lstStyle/>
               <a:p>
@@ -13984,16 +15193,6 @@
                 <a:r>
                   <a:rPr lang="en-US" dirty="0"/>
                   <a:t>Prove system convergence by showing Lyapunov function decreases to zero.</a:t>
-                </a:r>
-              </a:p>
-              <a:p>
-                <a:pPr marL="342900" indent="-342900">
-                  <a:buFont typeface="Arial" panose="020B0604020202020204" pitchFamily="34" charset="0"/>
-                  <a:buChar char="•"/>
-                </a:pPr>
-                <a:r>
-                  <a:rPr lang="en-US" b="1" dirty="0"/>
-                  <a:t>Example for Convergence Proof:</a:t>
                 </a:r>
               </a:p>
               <a:p>
@@ -14656,8 +15855,8 @@
           </a:p>
         </p:txBody>
       </p:sp>
-      <mc:AlternateContent xmlns:mc="http://schemas.openxmlformats.org/markup-compatibility/2006">
-        <mc:Choice xmlns:a14="http://schemas.microsoft.com/office/drawing/2010/main" Requires="a14">
+      <mc:AlternateContent xmlns:mc="http://schemas.openxmlformats.org/markup-compatibility/2006" xmlns:a14="http://schemas.microsoft.com/office/drawing/2010/main">
+        <mc:Choice Requires="a14">
           <p:sp>
             <p:nvSpPr>
               <p:cNvPr id="3" name="Content Placeholder 2">
@@ -15631,7 +16830,7 @@
             </p:txBody>
           </p:sp>
         </mc:Choice>
-        <mc:Fallback>
+        <mc:Fallback xmlns="">
           <p:sp>
             <p:nvSpPr>
               <p:cNvPr id="3" name="Content Placeholder 2">
@@ -15808,7 +17007,7 @@
           <p:cNvPr id="2" name="Title 1">
             <a:extLst>
               <a:ext uri="{FF2B5EF4-FFF2-40B4-BE49-F238E27FC236}">
-                <a16:creationId xmlns:a16="http://schemas.microsoft.com/office/drawing/2014/main" id="{6B9C59A1-DAC8-4D94-E84E-24DCBE86B091}"/>
+                <a16:creationId xmlns:a16="http://schemas.microsoft.com/office/drawing/2014/main" id="{BF463CB3-2956-E8D2-C23D-A3BAA7295DEC}"/>
               </a:ext>
             </a:extLst>
           </p:cNvPr>
@@ -15819,52 +17018,35 @@
             <p:ph type="ctrTitle"/>
           </p:nvPr>
         </p:nvSpPr>
-        <p:spPr/>
+        <p:spPr>
+          <a:xfrm>
+            <a:off x="2815929" y="1349825"/>
+            <a:ext cx="6560142" cy="3063149"/>
+          </a:xfrm>
+          <a:noFill/>
+        </p:spPr>
         <p:txBody>
           <a:bodyPr/>
           <a:lstStyle/>
           <a:p>
             <a:r>
               <a:rPr lang="en-US" dirty="0"/>
-              <a:t>Collision Avoidance Mechanisms</a:t>
+              <a:t>agents' trajectories</a:t>
             </a:r>
-            <a:endParaRPr lang="LID4096" dirty="0"/>
-          </a:p>
-        </p:txBody>
-      </p:sp>
-      <p:sp>
-        <p:nvSpPr>
-          <p:cNvPr id="3" name="Subtitle 2">
-            <a:extLst>
-              <a:ext uri="{FF2B5EF4-FFF2-40B4-BE49-F238E27FC236}">
-                <a16:creationId xmlns:a16="http://schemas.microsoft.com/office/drawing/2014/main" id="{F4944F0E-1F8A-B5F4-9996-4789F15B84DD}"/>
-              </a:ext>
-            </a:extLst>
-          </p:cNvPr>
-          <p:cNvSpPr>
-            <a:spLocks noGrp="1"/>
-          </p:cNvSpPr>
-          <p:nvPr>
-            <p:ph type="subTitle" idx="1"/>
-          </p:nvPr>
-        </p:nvSpPr>
-        <p:spPr/>
-        <p:txBody>
-          <a:bodyPr/>
-          <a:lstStyle/>
-          <a:p>
+            <a:br>
+              <a:rPr lang="en-US" dirty="0"/>
+            </a:br>
             <a:r>
               <a:rPr lang="en-US" dirty="0"/>
-              <a:t>Efficient Collision Avoidance in Multi-Agent Systems</a:t>
+              <a:t>Bearing-only vs Position Sensing</a:t>
             </a:r>
-            <a:endParaRPr lang="LID4096" dirty="0"/>
           </a:p>
         </p:txBody>
       </p:sp>
     </p:spTree>
     <p:extLst>
       <p:ext uri="{BB962C8B-B14F-4D97-AF65-F5344CB8AC3E}">
-        <p14:creationId xmlns:p14="http://schemas.microsoft.com/office/powerpoint/2010/main" val="2565870887"/>
+        <p14:creationId xmlns:p14="http://schemas.microsoft.com/office/powerpoint/2010/main" val="1429799020"/>
       </p:ext>
     </p:extLst>
   </p:cSld>
@@ -15896,7 +17078,7 @@
           <p:cNvPr id="2" name="Title 1">
             <a:extLst>
               <a:ext uri="{FF2B5EF4-FFF2-40B4-BE49-F238E27FC236}">
-                <a16:creationId xmlns:a16="http://schemas.microsoft.com/office/drawing/2014/main" id="{EA8C3738-60A7-4FA6-71C4-E51A890C4F3B}"/>
+                <a16:creationId xmlns:a16="http://schemas.microsoft.com/office/drawing/2014/main" id="{6B9C59A1-DAC8-4D94-E84E-24DCBE86B091}"/>
               </a:ext>
             </a:extLst>
           </p:cNvPr>
@@ -15904,7 +17086,7 @@
             <a:spLocks noGrp="1"/>
           </p:cNvSpPr>
           <p:nvPr>
-            <p:ph type="title"/>
+            <p:ph type="ctrTitle"/>
           </p:nvPr>
         </p:nvSpPr>
         <p:spPr/>
@@ -15914,176 +17096,45 @@
           <a:p>
             <a:r>
               <a:rPr lang="en-US" dirty="0"/>
-              <a:t>Naive Collision Adjustment</a:t>
+              <a:t>Collision Avoidance Mechanisms</a:t>
             </a:r>
             <a:endParaRPr lang="LID4096" dirty="0"/>
           </a:p>
         </p:txBody>
       </p:sp>
-      <mc:AlternateContent xmlns:mc="http://schemas.openxmlformats.org/markup-compatibility/2006" xmlns:a14="http://schemas.microsoft.com/office/drawing/2010/main">
-        <mc:Choice Requires="a14">
-          <p:sp>
-            <p:nvSpPr>
-              <p:cNvPr id="3" name="Content Placeholder 2">
-                <a:extLst>
-                  <a:ext uri="{FF2B5EF4-FFF2-40B4-BE49-F238E27FC236}">
-                    <a16:creationId xmlns:a16="http://schemas.microsoft.com/office/drawing/2014/main" id="{73003A05-105E-BDAB-4561-E6685DEB698F}"/>
-                  </a:ext>
-                </a:extLst>
-              </p:cNvPr>
-              <p:cNvSpPr>
-                <a:spLocks noGrp="1"/>
-              </p:cNvSpPr>
-              <p:nvPr>
-                <p:ph idx="1"/>
-              </p:nvPr>
-            </p:nvSpPr>
-            <p:spPr/>
-            <p:txBody>
-              <a:bodyPr>
-                <a:normAutofit/>
-              </a:bodyPr>
-              <a:lstStyle/>
-              <a:p>
-                <a:pPr marL="342900" indent="-342900">
-                  <a:buFont typeface="Arial" panose="020B0604020202020204" pitchFamily="34" charset="0"/>
-                  <a:buChar char="•"/>
-                </a:pPr>
-                <a:r>
-                  <a:rPr lang="en-US" b="1" dirty="0"/>
-                  <a:t>Idea: </a:t>
-                </a:r>
-                <a:r>
-                  <a:rPr lang="en-US" dirty="0"/>
-                  <a:t>Direct comparison of every agent's position to detect and resolve collisions.</a:t>
-                </a:r>
-              </a:p>
-              <a:p>
-                <a:pPr marL="342900" indent="-342900">
-                  <a:buFont typeface="Arial" panose="020B0604020202020204" pitchFamily="34" charset="0"/>
-                  <a:buChar char="•"/>
-                </a:pPr>
-                <a:r>
-                  <a:rPr lang="en-US" b="1" dirty="0"/>
-                  <a:t>Process: </a:t>
-                </a:r>
-                <a:r>
-                  <a:rPr lang="en-US" dirty="0"/>
-                  <a:t>Compute differences and distances between all agent pairs. Adjust velocities for agents moving towards each other.</a:t>
-                </a:r>
-              </a:p>
-              <a:p>
-                <a:pPr marL="342900" indent="-342900">
-                  <a:buFont typeface="Arial" panose="020B0604020202020204" pitchFamily="34" charset="0"/>
-                  <a:buChar char="•"/>
-                </a:pPr>
-                <a:r>
-                  <a:rPr lang="en-US" dirty="0"/>
-                  <a:t>Time Complexity: </a:t>
-                </a:r>
-                <a14:m>
-                  <m:oMath xmlns:m="http://schemas.openxmlformats.org/officeDocument/2006/math">
-                    <m:r>
-                      <a:rPr lang="en-US" b="0" i="1" smtClean="0">
-                        <a:latin typeface="Cambria Math" panose="02040503050406030204" pitchFamily="18" charset="0"/>
-                      </a:rPr>
-                      <m:t>𝑂</m:t>
-                    </m:r>
-                    <m:d>
-                      <m:dPr>
-                        <m:ctrlPr>
-                          <a:rPr lang="en-US" b="0" i="1" smtClean="0">
-                            <a:latin typeface="Cambria Math" panose="02040503050406030204" pitchFamily="18" charset="0"/>
-                          </a:rPr>
-                        </m:ctrlPr>
-                      </m:dPr>
-                      <m:e>
-                        <m:sSup>
-                          <m:sSupPr>
-                            <m:ctrlPr>
-                              <a:rPr lang="en-US" b="0" i="1" smtClean="0">
-                                <a:latin typeface="Cambria Math" panose="02040503050406030204" pitchFamily="18" charset="0"/>
-                              </a:rPr>
-                            </m:ctrlPr>
-                          </m:sSupPr>
-                          <m:e>
-                            <m:r>
-                              <a:rPr lang="en-US" b="0" i="1" smtClean="0">
-                                <a:latin typeface="Cambria Math" panose="02040503050406030204" pitchFamily="18" charset="0"/>
-                              </a:rPr>
-                              <m:t>𝑛</m:t>
-                            </m:r>
-                          </m:e>
-                          <m:sup>
-                            <m:r>
-                              <a:rPr lang="en-US" b="0" i="1" smtClean="0">
-                                <a:latin typeface="Cambria Math" panose="02040503050406030204" pitchFamily="18" charset="0"/>
-                              </a:rPr>
-                              <m:t>2</m:t>
-                            </m:r>
-                          </m:sup>
-                        </m:sSup>
-                      </m:e>
-                    </m:d>
-                  </m:oMath>
-                </a14:m>
-                <a:endParaRPr lang="en-US" dirty="0"/>
-              </a:p>
-              <a:p>
-                <a:pPr marL="1143000" lvl="1"/>
-                <a:r>
-                  <a:rPr lang="en-US" dirty="0"/>
-                  <a:t>Each agent is compared with every other agent to detect collisions</a:t>
-                </a:r>
-                <a:endParaRPr lang="LID4096" dirty="0"/>
-              </a:p>
-            </p:txBody>
-          </p:sp>
-        </mc:Choice>
-        <mc:Fallback xmlns="">
-          <p:sp>
-            <p:nvSpPr>
-              <p:cNvPr id="3" name="Content Placeholder 2">
-                <a:extLst>
-                  <a:ext uri="{FF2B5EF4-FFF2-40B4-BE49-F238E27FC236}">
-                    <a16:creationId xmlns:a16="http://schemas.microsoft.com/office/drawing/2014/main" id="{73003A05-105E-BDAB-4561-E6685DEB698F}"/>
-                  </a:ext>
-                </a:extLst>
-              </p:cNvPr>
-              <p:cNvSpPr>
-                <a:spLocks noGrp="1" noRot="1" noChangeAspect="1" noMove="1" noResize="1" noEditPoints="1" noAdjustHandles="1" noChangeArrowheads="1" noChangeShapeType="1" noTextEdit="1"/>
-              </p:cNvSpPr>
-              <p:nvPr>
-                <p:ph idx="1"/>
-              </p:nvPr>
-            </p:nvSpPr>
-            <p:spPr>
-              <a:blipFill>
-                <a:blip r:embed="rId2"/>
-                <a:stretch>
-                  <a:fillRect l="-1538"/>
-                </a:stretch>
-              </a:blipFill>
-            </p:spPr>
-            <p:txBody>
-              <a:bodyPr/>
-              <a:lstStyle/>
-              <a:p>
-                <a:r>
-                  <a:rPr lang="LID4096">
-                    <a:noFill/>
-                  </a:rPr>
-                  <a:t> </a:t>
-                </a:r>
-              </a:p>
-            </p:txBody>
-          </p:sp>
-        </mc:Fallback>
-      </mc:AlternateContent>
+      <p:sp>
+        <p:nvSpPr>
+          <p:cNvPr id="3" name="Subtitle 2">
+            <a:extLst>
+              <a:ext uri="{FF2B5EF4-FFF2-40B4-BE49-F238E27FC236}">
+                <a16:creationId xmlns:a16="http://schemas.microsoft.com/office/drawing/2014/main" id="{F4944F0E-1F8A-B5F4-9996-4789F15B84DD}"/>
+              </a:ext>
+            </a:extLst>
+          </p:cNvPr>
+          <p:cNvSpPr>
+            <a:spLocks noGrp="1"/>
+          </p:cNvSpPr>
+          <p:nvPr>
+            <p:ph type="subTitle" idx="1"/>
+          </p:nvPr>
+        </p:nvSpPr>
+        <p:spPr/>
+        <p:txBody>
+          <a:bodyPr/>
+          <a:lstStyle/>
+          <a:p>
+            <a:r>
+              <a:rPr lang="en-US" dirty="0"/>
+              <a:t>Efficient Collision Avoidance in Multi-Agent Systems</a:t>
+            </a:r>
+            <a:endParaRPr lang="LID4096" dirty="0"/>
+          </a:p>
+        </p:txBody>
+      </p:sp>
     </p:spTree>
     <p:extLst>
       <p:ext uri="{BB962C8B-B14F-4D97-AF65-F5344CB8AC3E}">
-        <p14:creationId xmlns:p14="http://schemas.microsoft.com/office/powerpoint/2010/main" val="3032113058"/>
+        <p14:creationId xmlns:p14="http://schemas.microsoft.com/office/powerpoint/2010/main" val="2565870887"/>
       </p:ext>
     </p:extLst>
   </p:cSld>
@@ -16925,15 +17976,6 @@
 </file>
 
 <file path=customXml/item1.xml><?xml version="1.0" encoding="utf-8"?>
-<?mso-contentType ?>
-<FormTemplates xmlns="http://schemas.microsoft.com/sharepoint/v3/contenttype/forms">
-  <Display>DocumentLibraryForm</Display>
-  <Edit>DocumentLibraryForm</Edit>
-  <New>DocumentLibraryForm</New>
-</FormTemplates>
-</file>
-
-<file path=customXml/item2.xml><?xml version="1.0" encoding="utf-8"?>
 <ct:contentTypeSchema xmlns:ct="http://schemas.microsoft.com/office/2006/metadata/contentType" xmlns:ma="http://schemas.microsoft.com/office/2006/metadata/properties/metaAttributes" ct:_="" ma:_="" ma:contentTypeName="Document" ma:contentTypeID="0x01010079F111ED35F8CC479449609E8A0923A6" ma:contentTypeVersion="28" ma:contentTypeDescription="Create a new document." ma:contentTypeScope="" ma:versionID="60f5a4f2d2b0abadcf532d48ebf9cb71">
   <xsd:schema xmlns:xsd="http://www.w3.org/2001/XMLSchema" xmlns:xs="http://www.w3.org/2001/XMLSchema" xmlns:p="http://schemas.microsoft.com/office/2006/metadata/properties" xmlns:ns1="http://schemas.microsoft.com/sharepoint/v3" xmlns:ns2="71af3243-3dd4-4a8d-8c0d-dd76da1f02a5" xmlns:ns3="16c05727-aa75-4e4a-9b5f-8a80a1165891" xmlns:ns4="230e9df3-be65-4c73-a93b-d1236ebd677e" targetNamespace="http://schemas.microsoft.com/office/2006/metadata/properties" ma:root="true" ma:fieldsID="7dd78129e6a1811f84807ad11c651531" ns1:_="" ns2:_="" ns3:_="" ns4:_="">
     <xsd:import namespace="http://schemas.microsoft.com/sharepoint/v3"/>
@@ -17245,7 +18287,7 @@
 </ct:contentTypeSchema>
 </file>
 
-<file path=customXml/item3.xml><?xml version="1.0" encoding="utf-8"?>
+<file path=customXml/item2.xml><?xml version="1.0" encoding="utf-8"?>
 <p:properties xmlns:p="http://schemas.microsoft.com/office/2006/metadata/properties" xmlns:xsi="http://www.w3.org/2001/XMLSchema-instance" xmlns:pc="http://schemas.microsoft.com/office/infopath/2007/PartnerControls">
   <documentManagement>
     <_ip_UnifiedCompliancePolicyUIAction xmlns="http://schemas.microsoft.com/sharepoint/v3" xsi:nil="true"/>
@@ -17265,15 +18307,16 @@
 </p:properties>
 </file>
 
-<file path=customXml/itemProps1.xml><?xml version="1.0" encoding="utf-8"?>
-<ds:datastoreItem xmlns:ds="http://schemas.openxmlformats.org/officeDocument/2006/customXml" ds:itemID="{4E60708A-6461-4D7F-883F-7E25D731D326}">
-  <ds:schemaRefs>
-    <ds:schemaRef ds:uri="http://schemas.microsoft.com/sharepoint/v3/contenttype/forms"/>
-  </ds:schemaRefs>
-</ds:datastoreItem>
+<file path=customXml/item3.xml><?xml version="1.0" encoding="utf-8"?>
+<?mso-contentType ?>
+<FormTemplates xmlns="http://schemas.microsoft.com/sharepoint/v3/contenttype/forms">
+  <Display>DocumentLibraryForm</Display>
+  <Edit>DocumentLibraryForm</Edit>
+  <New>DocumentLibraryForm</New>
+</FormTemplates>
 </file>
 
-<file path=customXml/itemProps2.xml><?xml version="1.0" encoding="utf-8"?>
+<file path=customXml/itemProps1.xml><?xml version="1.0" encoding="utf-8"?>
 <ds:datastoreItem xmlns:ds="http://schemas.openxmlformats.org/officeDocument/2006/customXml" ds:itemID="{2BC90B52-91C7-4BE9-8AE0-180FFFE1100A}">
   <ds:schemaRefs>
     <ds:schemaRef ds:uri="http://schemas.microsoft.com/office/2006/metadata/contentType"/>
@@ -17294,7 +18337,7 @@
 </ds:datastoreItem>
 </file>
 
-<file path=customXml/itemProps3.xml><?xml version="1.0" encoding="utf-8"?>
+<file path=customXml/itemProps2.xml><?xml version="1.0" encoding="utf-8"?>
 <ds:datastoreItem xmlns:ds="http://schemas.openxmlformats.org/officeDocument/2006/customXml" ds:itemID="{E130005B-6102-4F3C-A26F-485DF1BF9717}">
   <ds:schemaRefs>
     <ds:schemaRef ds:uri="http://schemas.microsoft.com/office/2006/metadata/properties"/>
@@ -17306,6 +18349,14 @@
 </ds:datastoreItem>
 </file>
 
+<file path=customXml/itemProps3.xml><?xml version="1.0" encoding="utf-8"?>
+<ds:datastoreItem xmlns:ds="http://schemas.openxmlformats.org/officeDocument/2006/customXml" ds:itemID="{4E60708A-6461-4D7F-883F-7E25D731D326}">
+  <ds:schemaRefs>
+    <ds:schemaRef ds:uri="http://schemas.microsoft.com/sharepoint/v3/contenttype/forms"/>
+  </ds:schemaRefs>
+</ds:datastoreItem>
+</file>
+
 <file path=docMetadata/LabelInfo.xml><?xml version="1.0" encoding="utf-8"?>
 <clbl:labelList xmlns:clbl="http://schemas.microsoft.com/office/2020/mipLabelMetadata"/>
 </file>
</xml_diff>